<commit_message>
update title  on first slide
</commit_message>
<xml_diff>
--- a/slides/07-logistic-regression.pptx
+++ b/slides/07-logistic-regression.pptx
@@ -206,7 +206,7 @@
           <a:p>
             <a:fld id="{A5320152-7289-42ED-97D3-BBB411F9F8C0}" type="datetimeFigureOut">
               <a:rPr lang="en-US" smtClean="0"/>
-              <a:t>1/16/2026</a:t>
+              <a:t>1/30/2026</a:t>
             </a:fld>
             <a:endParaRPr lang="en-US"/>
           </a:p>
@@ -626,7 +626,7 @@
           <a:p>
             <a:fld id="{D1D1EADE-8E88-4C7C-8AC5-FB148DE4940E}" type="datetime1">
               <a:rPr lang="en-US" smtClean="0"/>
-              <a:t>1/16/2026</a:t>
+              <a:t>1/30/2026</a:t>
             </a:fld>
             <a:endParaRPr lang="en-US"/>
           </a:p>
@@ -826,7 +826,7 @@
           <a:p>
             <a:fld id="{EC3C8B9C-477D-492A-96AD-1FC2CC997A73}" type="datetime1">
               <a:rPr lang="en-US" smtClean="0"/>
-              <a:t>1/16/2026</a:t>
+              <a:t>1/30/2026</a:t>
             </a:fld>
             <a:endParaRPr lang="en-US"/>
           </a:p>
@@ -1036,7 +1036,7 @@
           <a:p>
             <a:fld id="{42D3AED5-E26D-4E29-B1B3-7847B6779594}" type="datetime1">
               <a:rPr lang="en-US" smtClean="0"/>
-              <a:t>1/16/2026</a:t>
+              <a:t>1/30/2026</a:t>
             </a:fld>
             <a:endParaRPr lang="en-US"/>
           </a:p>
@@ -1236,7 +1236,7 @@
           <a:p>
             <a:fld id="{157B6794-849E-4626-908B-D15793550EFB}" type="datetime1">
               <a:rPr lang="en-US" smtClean="0"/>
-              <a:t>1/16/2026</a:t>
+              <a:t>1/30/2026</a:t>
             </a:fld>
             <a:endParaRPr lang="en-US"/>
           </a:p>
@@ -1512,7 +1512,7 @@
           <a:p>
             <a:fld id="{63DB64E7-5594-42A3-ADBF-E95A7ACEAD64}" type="datetime1">
               <a:rPr lang="en-US" smtClean="0"/>
-              <a:t>1/16/2026</a:t>
+              <a:t>1/30/2026</a:t>
             </a:fld>
             <a:endParaRPr lang="en-US"/>
           </a:p>
@@ -1785,7 +1785,7 @@
           <a:p>
             <a:fld id="{18462B0B-D248-4FFB-8695-AD7FA4B1284A}" type="datetime1">
               <a:rPr lang="en-US" smtClean="0"/>
-              <a:t>1/16/2026</a:t>
+              <a:t>1/30/2026</a:t>
             </a:fld>
             <a:endParaRPr lang="en-US"/>
           </a:p>
@@ -2208,7 +2208,7 @@
           <a:p>
             <a:fld id="{D0378EFB-9159-4510-B73F-4F0409ADE937}" type="datetime1">
               <a:rPr lang="en-US" smtClean="0"/>
-              <a:t>1/16/2026</a:t>
+              <a:t>1/30/2026</a:t>
             </a:fld>
             <a:endParaRPr lang="en-US"/>
           </a:p>
@@ -2350,7 +2350,7 @@
           <a:p>
             <a:fld id="{89BC9412-2452-4BED-A324-9D8C115361AD}" type="datetime1">
               <a:rPr lang="en-US" smtClean="0"/>
-              <a:t>1/16/2026</a:t>
+              <a:t>1/30/2026</a:t>
             </a:fld>
             <a:endParaRPr lang="en-US"/>
           </a:p>
@@ -2463,7 +2463,7 @@
           <a:p>
             <a:fld id="{F5318F62-D251-40E8-A23C-F4CFE9FEAB41}" type="datetime1">
               <a:rPr lang="en-US" smtClean="0"/>
-              <a:t>1/16/2026</a:t>
+              <a:t>1/30/2026</a:t>
             </a:fld>
             <a:endParaRPr lang="en-US"/>
           </a:p>
@@ -2776,7 +2776,7 @@
           <a:p>
             <a:fld id="{44F76144-149E-4874-93A5-554A0357CF82}" type="datetime1">
               <a:rPr lang="en-US" smtClean="0"/>
-              <a:t>1/16/2026</a:t>
+              <a:t>1/30/2026</a:t>
             </a:fld>
             <a:endParaRPr lang="en-US"/>
           </a:p>
@@ -3069,7 +3069,7 @@
           <a:p>
             <a:fld id="{50BA65D8-0540-4835-AE5C-25D29DBA01BE}" type="datetime1">
               <a:rPr lang="en-US" smtClean="0"/>
-              <a:t>1/16/2026</a:t>
+              <a:t>1/30/2026</a:t>
             </a:fld>
             <a:endParaRPr lang="en-US"/>
           </a:p>
@@ -3311,7 +3311,7 @@
           <a:p>
             <a:fld id="{E31BA835-12AC-4E8F-955A-EA3F4DE2791F}" type="datetime1">
               <a:rPr lang="en-US" smtClean="0"/>
-              <a:t>1/16/2026</a:t>
+              <a:t>1/30/2026</a:t>
             </a:fld>
             <a:endParaRPr lang="en-US"/>
           </a:p>
@@ -4106,8 +4106,9 @@
           <a:p>
             <a:r>
               <a:rPr lang="en-US" sz="3600"/>
-              <a:t>Intro to Machine Learning</a:t>
-            </a:r>
+              <a:t>Logistic Regression</a:t>
+            </a:r>
+            <a:endParaRPr lang="en-US" sz="3600" dirty="0"/>
           </a:p>
         </p:txBody>
       </p:sp>
@@ -6525,7 +6526,7 @@
         </p:blipFill>
         <p:spPr>
           <a:xfrm>
-            <a:off x="3359153" y="3492955"/>
+            <a:off x="3359153" y="3477122"/>
             <a:ext cx="5473693" cy="813235"/>
           </a:xfrm>
           <a:prstGeom prst="rect">

</xml_diff>